<commit_message>
update to HTML slides
</commit_message>
<xml_diff>
--- a/Slides/HTML.pptx
+++ b/Slides/HTML.pptx
@@ -3297,7 +3297,7 @@
               </a:lnSpc>
             </a:pPr>
             <a:r>
-              <a:rPr lang="en-US" sz="1500" dirty="0">
+              <a:rPr lang="en-US" sz="1500" b="0" dirty="0">
                 <a:solidFill>
                   <a:srgbClr val="000000"/>
                 </a:solidFill>
@@ -3309,7 +3309,7 @@
               <a:t>&lt;html&gt;</a:t>
             </a:r>
             <a:r>
-              <a:rPr lang="en-US" sz="1500" dirty="0">
+              <a:rPr lang="en-US" sz="1500" b="0" dirty="0">
                 <a:solidFill>
                   <a:srgbClr val="000000"/>
                 </a:solidFill>
@@ -3321,7 +3321,7 @@
               <a:t/>
             </a:r>
             <a:br>
-              <a:rPr lang="en-US" sz="1500" dirty="0">
+              <a:rPr lang="en-US" sz="1500" b="0" dirty="0">
                 <a:solidFill>
                   <a:srgbClr val="000000"/>
                 </a:solidFill>
@@ -3332,7 +3332,7 @@
               </a:rPr>
             </a:br>
             <a:r>
-              <a:rPr lang="en-US" sz="1500" dirty="0">
+              <a:rPr lang="en-US" sz="1500" b="0" dirty="0">
                 <a:solidFill>
                   <a:srgbClr val="000000"/>
                 </a:solidFill>
@@ -3344,7 +3344,7 @@
               <a:t>  &lt;head&gt;</a:t>
             </a:r>
             <a:r>
-              <a:rPr lang="en-US" sz="1500" dirty="0">
+              <a:rPr lang="en-US" sz="1500" b="0" dirty="0">
                 <a:solidFill>
                   <a:srgbClr val="000000"/>
                 </a:solidFill>
@@ -3356,7 +3356,7 @@
               <a:t/>
             </a:r>
             <a:br>
-              <a:rPr lang="en-US" sz="1500" dirty="0">
+              <a:rPr lang="en-US" sz="1500" b="0" dirty="0">
                 <a:solidFill>
                   <a:srgbClr val="000000"/>
                 </a:solidFill>
@@ -3367,7 +3367,7 @@
               </a:rPr>
             </a:br>
             <a:r>
-              <a:rPr lang="en-US" sz="1500" dirty="0">
+              <a:rPr lang="en-US" sz="1500" b="0" dirty="0">
                 <a:solidFill>
                   <a:srgbClr val="000000"/>
                 </a:solidFill>
@@ -3379,7 +3379,7 @@
               <a:t>    &lt;title&gt;Sample Page&lt;/title&gt;</a:t>
             </a:r>
             <a:r>
-              <a:rPr lang="en-US" sz="1500" dirty="0">
+              <a:rPr lang="en-US" sz="1500" b="0" dirty="0">
                 <a:solidFill>
                   <a:srgbClr val="000000"/>
                 </a:solidFill>
@@ -3391,7 +3391,7 @@
               <a:t/>
             </a:r>
             <a:br>
-              <a:rPr lang="en-US" sz="1500" dirty="0">
+              <a:rPr lang="en-US" sz="1500" b="0" dirty="0">
                 <a:solidFill>
                   <a:srgbClr val="000000"/>
                 </a:solidFill>
@@ -3402,7 +3402,7 @@
               </a:rPr>
             </a:br>
             <a:r>
-              <a:rPr lang="en-US" sz="1500" dirty="0">
+              <a:rPr lang="en-US" sz="1500" b="0" dirty="0">
                 <a:solidFill>
                   <a:srgbClr val="000000"/>
                 </a:solidFill>
@@ -3414,7 +3414,7 @@
               <a:t>  &lt;/head&gt;</a:t>
             </a:r>
             <a:r>
-              <a:rPr lang="en-US" sz="1500" dirty="0">
+              <a:rPr lang="en-US" sz="1500" b="0" dirty="0">
                 <a:solidFill>
                   <a:srgbClr val="000000"/>
                 </a:solidFill>
@@ -3426,7 +3426,7 @@
               <a:t/>
             </a:r>
             <a:br>
-              <a:rPr lang="en-US" sz="1500" dirty="0">
+              <a:rPr lang="en-US" sz="1500" b="0" dirty="0">
                 <a:solidFill>
                   <a:srgbClr val="000000"/>
                 </a:solidFill>
@@ -3437,7 +3437,7 @@
               </a:rPr>
             </a:br>
             <a:r>
-              <a:rPr lang="en-US" sz="1500" dirty="0">
+              <a:rPr lang="en-US" sz="1500" b="0" dirty="0">
                 <a:solidFill>
                   <a:srgbClr val="000000"/>
                 </a:solidFill>
@@ -3449,7 +3449,7 @@
               <a:t>  &lt;body&gt;</a:t>
             </a:r>
             <a:r>
-              <a:rPr lang="en-US" sz="1500" dirty="0">
+              <a:rPr lang="en-US" sz="1500" b="0" dirty="0">
                 <a:solidFill>
                   <a:srgbClr val="000000"/>
                 </a:solidFill>
@@ -3461,7 +3461,7 @@
               <a:t/>
             </a:r>
             <a:br>
-              <a:rPr lang="en-US" sz="1500" dirty="0">
+              <a:rPr lang="en-US" sz="1500" b="0" dirty="0">
                 <a:solidFill>
                   <a:srgbClr val="000000"/>
                 </a:solidFill>
@@ -3472,7 +3472,7 @@
               </a:rPr>
             </a:br>
             <a:r>
-              <a:rPr lang="en-US" sz="1500" dirty="0">
+              <a:rPr lang="en-US" sz="1500" b="0" dirty="0">
                 <a:solidFill>
                   <a:srgbClr val="000000"/>
                 </a:solidFill>
@@ -3484,7 +3484,7 @@
               <a:t>    &lt;h1&gt;This is a test page&lt;/h1&gt;</a:t>
             </a:r>
             <a:r>
-              <a:rPr lang="en-US" sz="1500" dirty="0">
+              <a:rPr lang="en-US" sz="1500" b="0" dirty="0">
                 <a:solidFill>
                   <a:srgbClr val="000000"/>
                 </a:solidFill>
@@ -3496,7 +3496,7 @@
               <a:t/>
             </a:r>
             <a:br>
-              <a:rPr lang="en-US" sz="1500" dirty="0">
+              <a:rPr lang="en-US" sz="1500" b="0" dirty="0">
                 <a:solidFill>
                   <a:srgbClr val="000000"/>
                 </a:solidFill>
@@ -3507,7 +3507,7 @@
               </a:rPr>
             </a:br>
             <a:r>
-              <a:rPr lang="en-US" sz="1500" dirty="0">
+              <a:rPr lang="en-US" sz="1500" b="0" dirty="0">
                 <a:solidFill>
                   <a:srgbClr val="000000"/>
                 </a:solidFill>
@@ -3519,7 +3519,7 @@
               <a:t>    &lt;p&gt;</a:t>
             </a:r>
             <a:r>
-              <a:rPr lang="en-US" sz="1500" dirty="0">
+              <a:rPr lang="en-US" sz="1500" b="0" dirty="0">
                 <a:solidFill>
                   <a:srgbClr val="000000"/>
                 </a:solidFill>
@@ -3531,7 +3531,7 @@
               <a:t/>
             </a:r>
             <a:br>
-              <a:rPr lang="en-US" sz="1500" dirty="0">
+              <a:rPr lang="en-US" sz="1500" b="0" dirty="0">
                 <a:solidFill>
                   <a:srgbClr val="000000"/>
                 </a:solidFill>
@@ -3542,7 +3542,7 @@
               </a:rPr>
             </a:br>
             <a:r>
-              <a:rPr lang="en-US" sz="1500" dirty="0">
+              <a:rPr lang="en-US" sz="1500" b="0" dirty="0">
                 <a:solidFill>
                   <a:srgbClr val="000000"/>
                 </a:solidFill>
@@ -3554,7 +3554,7 @@
               <a:t>      This is some &lt;b&gt;bold&lt;/b&gt; text...and some &lt;</a:t>
             </a:r>
             <a:r>
-              <a:rPr lang="en-US" sz="1500" dirty="0" err="1">
+              <a:rPr lang="en-US" sz="1500" b="0" dirty="0" err="1">
                 <a:solidFill>
                   <a:srgbClr val="000000"/>
                 </a:solidFill>
@@ -3566,7 +3566,7 @@
               <a:t>i</a:t>
             </a:r>
             <a:r>
-              <a:rPr lang="en-US" sz="1500" dirty="0">
+              <a:rPr lang="en-US" sz="1500" b="0" dirty="0">
                 <a:solidFill>
                   <a:srgbClr val="000000"/>
                 </a:solidFill>
@@ -3578,7 +3578,7 @@
               <a:t>&gt;italic&lt;/</a:t>
             </a:r>
             <a:r>
-              <a:rPr lang="en-US" sz="1500" dirty="0" err="1">
+              <a:rPr lang="en-US" sz="1500" b="0" dirty="0" err="1">
                 <a:solidFill>
                   <a:srgbClr val="000000"/>
                 </a:solidFill>
@@ -3590,7 +3590,7 @@
               <a:t>i</a:t>
             </a:r>
             <a:r>
-              <a:rPr lang="en-US" sz="1500" dirty="0">
+              <a:rPr lang="en-US" sz="1500" b="0" dirty="0">
                 <a:solidFill>
                   <a:srgbClr val="000000"/>
                 </a:solidFill>
@@ -3602,7 +3602,7 @@
               <a:t>&gt; text.</a:t>
             </a:r>
             <a:r>
-              <a:rPr lang="en-US" sz="1500" dirty="0">
+              <a:rPr lang="en-US" sz="1500" b="0" dirty="0">
                 <a:solidFill>
                   <a:srgbClr val="000000"/>
                 </a:solidFill>
@@ -3614,7 +3614,7 @@
               <a:t/>
             </a:r>
             <a:br>
-              <a:rPr lang="en-US" sz="1500" dirty="0">
+              <a:rPr lang="en-US" sz="1500" b="0" dirty="0">
                 <a:solidFill>
                   <a:srgbClr val="000000"/>
                 </a:solidFill>
@@ -3625,7 +3625,7 @@
               </a:rPr>
             </a:br>
             <a:r>
-              <a:rPr lang="en-US" sz="1500" dirty="0">
+              <a:rPr lang="en-US" sz="1500" b="0" dirty="0">
                 <a:solidFill>
                   <a:srgbClr val="000000"/>
                 </a:solidFill>
@@ -3637,7 +3637,7 @@
               <a:t>    &lt;/p&gt;</a:t>
             </a:r>
             <a:r>
-              <a:rPr lang="en-US" sz="1500" dirty="0">
+              <a:rPr lang="en-US" sz="1500" b="0" dirty="0">
                 <a:solidFill>
                   <a:srgbClr val="000000"/>
                 </a:solidFill>
@@ -3649,7 +3649,7 @@
               <a:t/>
             </a:r>
             <a:br>
-              <a:rPr lang="en-US" sz="1500" dirty="0">
+              <a:rPr lang="en-US" sz="1500" b="0" dirty="0">
                 <a:solidFill>
                   <a:srgbClr val="000000"/>
                 </a:solidFill>
@@ -3660,7 +3660,7 @@
               </a:rPr>
             </a:br>
             <a:r>
-              <a:rPr lang="en-US" sz="1500" dirty="0">
+              <a:rPr lang="en-US" sz="1500" b="0" dirty="0">
                 <a:solidFill>
                   <a:srgbClr val="000000"/>
                 </a:solidFill>
@@ -3672,7 +3672,7 @@
               <a:t>    &lt;p&gt;</a:t>
             </a:r>
             <a:r>
-              <a:rPr lang="en-US" sz="1500" dirty="0">
+              <a:rPr lang="en-US" sz="1500" b="0" dirty="0">
                 <a:solidFill>
                   <a:srgbClr val="000000"/>
                 </a:solidFill>
@@ -3684,7 +3684,7 @@
               <a:t/>
             </a:r>
             <a:br>
-              <a:rPr lang="en-US" sz="1500" dirty="0">
+              <a:rPr lang="en-US" sz="1500" b="0" dirty="0">
                 <a:solidFill>
                   <a:srgbClr val="000000"/>
                 </a:solidFill>
@@ -3695,7 +3695,7 @@
               </a:rPr>
             </a:br>
             <a:r>
-              <a:rPr lang="en-US" sz="1500" dirty="0">
+              <a:rPr lang="en-US" sz="1500" b="0" dirty="0">
                 <a:solidFill>
                   <a:srgbClr val="000000"/>
                 </a:solidFill>
@@ -3714,7 +3714,7 @@
               </a:lnSpc>
             </a:pPr>
             <a:r>
-              <a:rPr lang="en-US" sz="1500" dirty="0">
+              <a:rPr lang="en-US" sz="1500" b="0" dirty="0">
                 <a:solidFill>
                   <a:srgbClr val="000000"/>
                 </a:solidFill>
@@ -3726,7 +3726,7 @@
               <a:t>            &lt;a </a:t>
             </a:r>
             <a:r>
-              <a:rPr lang="en-US" sz="1500" dirty="0" err="1">
+              <a:rPr lang="en-US" sz="1500" b="0" dirty="0" err="1">
                 <a:solidFill>
                   <a:srgbClr val="000000"/>
                 </a:solidFill>
@@ -3738,7 +3738,7 @@
               <a:t>href</a:t>
             </a:r>
             <a:r>
-              <a:rPr lang="en-US" sz="1500" dirty="0">
+              <a:rPr lang="en-US" sz="1500" b="0" dirty="0">
                 <a:solidFill>
                   <a:srgbClr val="000000"/>
                 </a:solidFill>
@@ -3750,7 +3750,7 @@
               <a:t>="http://</a:t>
             </a:r>
             <a:r>
-              <a:rPr lang="en-US" sz="1500" dirty="0" err="1">
+              <a:rPr lang="en-US" sz="1500" b="0" dirty="0" err="1">
                 <a:solidFill>
                   <a:srgbClr val="000000"/>
                 </a:solidFill>
@@ -3762,7 +3762,7 @@
               <a:t>www.cs.usfca.edu</a:t>
             </a:r>
             <a:r>
-              <a:rPr lang="en-US" sz="1500" dirty="0">
+              <a:rPr lang="en-US" sz="1500" b="0" dirty="0">
                 <a:solidFill>
                   <a:srgbClr val="000000"/>
                 </a:solidFill>
@@ -3774,7 +3774,7 @@
               <a:t>"&gt;link&lt;/a&gt;.</a:t>
             </a:r>
             <a:r>
-              <a:rPr lang="en-US" sz="1500" dirty="0">
+              <a:rPr lang="en-US" sz="1500" b="0" dirty="0">
                 <a:solidFill>
                   <a:srgbClr val="000000"/>
                 </a:solidFill>
@@ -3786,7 +3786,7 @@
               <a:t/>
             </a:r>
             <a:br>
-              <a:rPr lang="en-US" sz="1500" dirty="0">
+              <a:rPr lang="en-US" sz="1500" b="0" dirty="0">
                 <a:solidFill>
                   <a:srgbClr val="000000"/>
                 </a:solidFill>
@@ -3797,7 +3797,7 @@
               </a:rPr>
             </a:br>
             <a:r>
-              <a:rPr lang="en-US" sz="1500" dirty="0">
+              <a:rPr lang="en-US" sz="1500" b="0" dirty="0">
                 <a:solidFill>
                   <a:srgbClr val="000000"/>
                 </a:solidFill>
@@ -3809,7 +3809,7 @@
               <a:t>    &lt;/p&gt;</a:t>
             </a:r>
             <a:r>
-              <a:rPr lang="en-US" sz="1500" dirty="0">
+              <a:rPr lang="en-US" sz="1500" b="0" dirty="0">
                 <a:solidFill>
                   <a:srgbClr val="000000"/>
                 </a:solidFill>
@@ -3821,7 +3821,7 @@
               <a:t/>
             </a:r>
             <a:br>
-              <a:rPr lang="en-US" sz="1500" dirty="0">
+              <a:rPr lang="en-US" sz="1500" b="0" dirty="0">
                 <a:solidFill>
                   <a:srgbClr val="000000"/>
                 </a:solidFill>
@@ -3832,7 +3832,7 @@
               </a:rPr>
             </a:br>
             <a:r>
-              <a:rPr lang="en-US" sz="1500" dirty="0">
+              <a:rPr lang="en-US" sz="1500" b="0" dirty="0">
                 <a:solidFill>
                   <a:srgbClr val="000000"/>
                 </a:solidFill>
@@ -3844,7 +3844,7 @@
               <a:t>    &lt;</a:t>
             </a:r>
             <a:r>
-              <a:rPr lang="en-US" sz="1500" dirty="0" err="1">
+              <a:rPr lang="en-US" sz="1500" b="0" dirty="0" err="1">
                 <a:solidFill>
                   <a:srgbClr val="000000"/>
                 </a:solidFill>
@@ -3856,7 +3856,7 @@
               <a:t>hr</a:t>
             </a:r>
             <a:r>
-              <a:rPr lang="en-US" sz="1500" dirty="0">
+              <a:rPr lang="en-US" sz="1500" b="0" dirty="0">
                 <a:solidFill>
                   <a:srgbClr val="000000"/>
                 </a:solidFill>
@@ -3868,7 +3868,7 @@
               <a:t>/&gt;</a:t>
             </a:r>
             <a:r>
-              <a:rPr lang="en-US" sz="1500" dirty="0">
+              <a:rPr lang="en-US" sz="1500" b="0" dirty="0">
                 <a:solidFill>
                   <a:srgbClr val="000000"/>
                 </a:solidFill>
@@ -3880,7 +3880,7 @@
               <a:t/>
             </a:r>
             <a:br>
-              <a:rPr lang="en-US" sz="1500" dirty="0">
+              <a:rPr lang="en-US" sz="1500" b="0" dirty="0">
                 <a:solidFill>
                   <a:srgbClr val="000000"/>
                 </a:solidFill>
@@ -3891,7 +3891,7 @@
               </a:rPr>
             </a:br>
             <a:r>
-              <a:rPr lang="en-US" sz="1500" dirty="0">
+              <a:rPr lang="en-US" sz="1500" b="0" dirty="0">
                 <a:solidFill>
                   <a:srgbClr val="000000"/>
                 </a:solidFill>
@@ -3903,7 +3903,7 @@
               <a:t>  &lt;/body&gt;</a:t>
             </a:r>
             <a:r>
-              <a:rPr lang="en-US" sz="1500" dirty="0">
+              <a:rPr lang="en-US" sz="1500" b="0" dirty="0">
                 <a:solidFill>
                   <a:srgbClr val="000000"/>
                 </a:solidFill>
@@ -3915,7 +3915,7 @@
               <a:t/>
             </a:r>
             <a:br>
-              <a:rPr lang="en-US" sz="1500" dirty="0">
+              <a:rPr lang="en-US" sz="1500" b="0" dirty="0">
                 <a:solidFill>
                   <a:srgbClr val="000000"/>
                 </a:solidFill>
@@ -3926,7 +3926,7 @@
               </a:rPr>
             </a:br>
             <a:r>
-              <a:rPr lang="en-US" sz="1500" dirty="0">
+              <a:rPr lang="en-US" sz="1500" b="0" dirty="0">
                 <a:solidFill>
                   <a:srgbClr val="000000"/>
                 </a:solidFill>
@@ -3938,7 +3938,7 @@
               <a:t>&lt;/html&gt;</a:t>
             </a:r>
             <a:r>
-              <a:rPr lang="en-US" sz="1500" dirty="0">
+              <a:rPr lang="en-US" sz="1500" b="0" dirty="0">
                 <a:solidFill>
                   <a:srgbClr val="000000"/>
                 </a:solidFill>
@@ -3950,7 +3950,7 @@
               <a:t/>
             </a:r>
             <a:br>
-              <a:rPr lang="en-US" sz="1500" dirty="0">
+              <a:rPr lang="en-US" sz="1500" b="0" dirty="0">
                 <a:solidFill>
                   <a:srgbClr val="000000"/>
                 </a:solidFill>
@@ -3960,7 +3960,7 @@
                 <a:sym typeface="Arial"/>
               </a:rPr>
             </a:br>
-            <a:endParaRPr lang="en-US" sz="1500" dirty="0">
+            <a:endParaRPr lang="en-US" sz="1500" b="0" dirty="0">
               <a:solidFill>
                 <a:srgbClr val="000000"/>
               </a:solidFill>
@@ -5121,6 +5121,18 @@
               <a:t>href</a:t>
             </a:r>
             <a:r>
+              <a:rPr lang="en-US" sz="1600" b="0" dirty="0" smtClean="0">
+                <a:solidFill>
+                  <a:srgbClr val="000000"/>
+                </a:solidFill>
+                <a:latin typeface="courier new"/>
+                <a:ea typeface="courier new"/>
+                <a:cs typeface="courier new"/>
+                <a:sym typeface="courier new"/>
+              </a:rPr>
+              <a:t>="</a:t>
+            </a:r>
+            <a:r>
               <a:rPr lang="en-US" sz="1600" b="0" dirty="0">
                 <a:solidFill>
                   <a:srgbClr val="000000"/>
@@ -5130,7 +5142,7 @@
                 <a:cs typeface="courier new"/>
                 <a:sym typeface="courier new"/>
               </a:rPr>
-              <a:t>="http://</a:t>
+              <a:t>http://</a:t>
             </a:r>
             <a:r>
               <a:rPr lang="en-US" sz="1600" b="0" dirty="0" err="1">

</xml_diff>